<commit_message>
Wroking :  Update SQL table Structure
</commit_message>
<xml_diff>
--- a/FullStackProject/documentation/chatDBStructure.pptx
+++ b/FullStackProject/documentation/chatDBStructure.pptx
@@ -200,7 +200,7 @@
           <a:p>
             <a:fld id="{DB6CA646-4DB0-4081-BAF1-518ED8EEB214}" type="datetimeFigureOut">
               <a:rPr lang="en-IN" smtClean="0"/>
-              <a:t>26-07-2024</a:t>
+              <a:t>27-07-2024</a:t>
             </a:fld>
             <a:endParaRPr lang="en-IN" dirty="0"/>
           </a:p>
@@ -885,7 +885,7 @@
           <a:p>
             <a:fld id="{40BFCB34-1D3A-4E3D-AF01-87C69294AC55}" type="datetimeFigureOut">
               <a:rPr lang="en-IN" smtClean="0"/>
-              <a:t>26-07-2024</a:t>
+              <a:t>27-07-2024</a:t>
             </a:fld>
             <a:endParaRPr lang="en-IN" dirty="0"/>
           </a:p>
@@ -1085,7 +1085,7 @@
           <a:p>
             <a:fld id="{40BFCB34-1D3A-4E3D-AF01-87C69294AC55}" type="datetimeFigureOut">
               <a:rPr lang="en-IN" smtClean="0"/>
-              <a:t>26-07-2024</a:t>
+              <a:t>27-07-2024</a:t>
             </a:fld>
             <a:endParaRPr lang="en-IN" dirty="0"/>
           </a:p>
@@ -1295,7 +1295,7 @@
           <a:p>
             <a:fld id="{40BFCB34-1D3A-4E3D-AF01-87C69294AC55}" type="datetimeFigureOut">
               <a:rPr lang="en-IN" smtClean="0"/>
-              <a:t>26-07-2024</a:t>
+              <a:t>27-07-2024</a:t>
             </a:fld>
             <a:endParaRPr lang="en-IN" dirty="0"/>
           </a:p>
@@ -1408,7 +1408,7 @@
           <a:p>
             <a:fld id="{53685DBC-317F-4C6B-AEE2-0BEBDE6560A6}" type="datetimeFigureOut">
               <a:rPr lang="en-US" smtClean="0"/>
-              <a:t>7/26/2024</a:t>
+              <a:t>7/27/2024</a:t>
             </a:fld>
             <a:endParaRPr lang="en-US" dirty="0"/>
           </a:p>
@@ -1608,7 +1608,7 @@
           <a:p>
             <a:fld id="{40BFCB34-1D3A-4E3D-AF01-87C69294AC55}" type="datetimeFigureOut">
               <a:rPr lang="en-IN" smtClean="0"/>
-              <a:t>26-07-2024</a:t>
+              <a:t>27-07-2024</a:t>
             </a:fld>
             <a:endParaRPr lang="en-IN" dirty="0"/>
           </a:p>
@@ -1884,7 +1884,7 @@
           <a:p>
             <a:fld id="{40BFCB34-1D3A-4E3D-AF01-87C69294AC55}" type="datetimeFigureOut">
               <a:rPr lang="en-IN" smtClean="0"/>
-              <a:t>26-07-2024</a:t>
+              <a:t>27-07-2024</a:t>
             </a:fld>
             <a:endParaRPr lang="en-IN" dirty="0"/>
           </a:p>
@@ -2152,7 +2152,7 @@
           <a:p>
             <a:fld id="{40BFCB34-1D3A-4E3D-AF01-87C69294AC55}" type="datetimeFigureOut">
               <a:rPr lang="en-IN" smtClean="0"/>
-              <a:t>26-07-2024</a:t>
+              <a:t>27-07-2024</a:t>
             </a:fld>
             <a:endParaRPr lang="en-IN" dirty="0"/>
           </a:p>
@@ -2567,7 +2567,7 @@
           <a:p>
             <a:fld id="{40BFCB34-1D3A-4E3D-AF01-87C69294AC55}" type="datetimeFigureOut">
               <a:rPr lang="en-IN" smtClean="0"/>
-              <a:t>26-07-2024</a:t>
+              <a:t>27-07-2024</a:t>
             </a:fld>
             <a:endParaRPr lang="en-IN" dirty="0"/>
           </a:p>
@@ -2709,7 +2709,7 @@
           <a:p>
             <a:fld id="{40BFCB34-1D3A-4E3D-AF01-87C69294AC55}" type="datetimeFigureOut">
               <a:rPr lang="en-IN" smtClean="0"/>
-              <a:t>26-07-2024</a:t>
+              <a:t>27-07-2024</a:t>
             </a:fld>
             <a:endParaRPr lang="en-IN" dirty="0"/>
           </a:p>
@@ -2822,7 +2822,7 @@
           <a:p>
             <a:fld id="{40BFCB34-1D3A-4E3D-AF01-87C69294AC55}" type="datetimeFigureOut">
               <a:rPr lang="en-IN" smtClean="0"/>
-              <a:t>26-07-2024</a:t>
+              <a:t>27-07-2024</a:t>
             </a:fld>
             <a:endParaRPr lang="en-IN" dirty="0"/>
           </a:p>
@@ -3135,7 +3135,7 @@
           <a:p>
             <a:fld id="{40BFCB34-1D3A-4E3D-AF01-87C69294AC55}" type="datetimeFigureOut">
               <a:rPr lang="en-IN" smtClean="0"/>
-              <a:t>26-07-2024</a:t>
+              <a:t>27-07-2024</a:t>
             </a:fld>
             <a:endParaRPr lang="en-IN" dirty="0"/>
           </a:p>
@@ -3424,7 +3424,7 @@
           <a:p>
             <a:fld id="{40BFCB34-1D3A-4E3D-AF01-87C69294AC55}" type="datetimeFigureOut">
               <a:rPr lang="en-IN" smtClean="0"/>
-              <a:t>26-07-2024</a:t>
+              <a:t>27-07-2024</a:t>
             </a:fld>
             <a:endParaRPr lang="en-IN" dirty="0"/>
           </a:p>
@@ -3667,7 +3667,7 @@
           <a:p>
             <a:fld id="{40BFCB34-1D3A-4E3D-AF01-87C69294AC55}" type="datetimeFigureOut">
               <a:rPr lang="en-IN" smtClean="0"/>
-              <a:t>26-07-2024</a:t>
+              <a:t>27-07-2024</a:t>
             </a:fld>
             <a:endParaRPr lang="en-IN" dirty="0"/>
           </a:p>
@@ -4238,7 +4238,7 @@
           <a:p>
             <a:fld id="{53685DBC-317F-4C6B-AEE2-0BEBDE6560A6}" type="datetimeFigureOut">
               <a:rPr lang="en-US" smtClean="0"/>
-              <a:t>7/26/2024</a:t>
+              <a:t>7/27/2024</a:t>
             </a:fld>
             <a:endParaRPr lang="en-US" dirty="0"/>
           </a:p>
@@ -12957,6 +12957,863 @@
               </a:rPr>
               <a:t>: AG</a:t>
             </a:r>
+          </a:p>
+        </p:txBody>
+      </p:sp>
+      <p:sp>
+        <p:nvSpPr>
+          <p:cNvPr id="2" name="TextBox 1">
+            <a:extLst>
+              <a:ext uri="{FF2B5EF4-FFF2-40B4-BE49-F238E27FC236}">
+                <a16:creationId xmlns:a16="http://schemas.microsoft.com/office/drawing/2014/main" id="{B983ADC1-BD5E-50D5-9CF6-8F895C1B81E1}"/>
+              </a:ext>
+            </a:extLst>
+          </p:cNvPr>
+          <p:cNvSpPr txBox="1"/>
+          <p:nvPr/>
+        </p:nvSpPr>
+        <p:spPr>
+          <a:xfrm>
+            <a:off x="0" y="1769857"/>
+            <a:ext cx="5645414" cy="3985706"/>
+          </a:xfrm>
+          <a:prstGeom prst="rect">
+            <a:avLst/>
+          </a:prstGeom>
+          <a:noFill/>
+        </p:spPr>
+        <p:txBody>
+          <a:bodyPr wrap="square" rtlCol="0">
+            <a:spAutoFit/>
+          </a:bodyPr>
+          <a:lstStyle/>
+          <a:p>
+            <a:r>
+              <a:rPr lang="en-US" sz="1100" dirty="0">
+                <a:latin typeface="Avenir Next LT Pro" panose="020B0504020202020204" pitchFamily="34" charset="0"/>
+              </a:rPr>
+              <a:t>Linkages Between Tables with Primary and Foreign Keys</a:t>
+            </a:r>
+          </a:p>
+          <a:p>
+            <a:endParaRPr lang="en-US" sz="1100" dirty="0">
+              <a:latin typeface="Avenir Next LT Pro" panose="020B0504020202020204" pitchFamily="34" charset="0"/>
+            </a:endParaRPr>
+          </a:p>
+          <a:p>
+            <a:pPr marL="228600" indent="-228600">
+              <a:buFont typeface="+mj-lt"/>
+              <a:buAutoNum type="arabicPeriod"/>
+            </a:pPr>
+            <a:r>
+              <a:rPr lang="en-US" sz="1100" dirty="0">
+                <a:latin typeface="Avenir Next LT Pro" panose="020B0504020202020204" pitchFamily="34" charset="0"/>
+              </a:rPr>
+              <a:t>User (</a:t>
+            </a:r>
+            <a:r>
+              <a:rPr lang="en-US" sz="1100" dirty="0" err="1">
+                <a:latin typeface="Avenir Next LT Pro" panose="020B0504020202020204" pitchFamily="34" charset="0"/>
+              </a:rPr>
+              <a:t>userID</a:t>
+            </a:r>
+            <a:r>
+              <a:rPr lang="en-US" sz="1100" dirty="0">
+                <a:latin typeface="Avenir Next LT Pro" panose="020B0504020202020204" pitchFamily="34" charset="0"/>
+              </a:rPr>
+              <a:t> - Primary) --------&gt; </a:t>
+            </a:r>
+            <a:r>
+              <a:rPr lang="en-US" sz="1100" dirty="0" err="1">
+                <a:latin typeface="Avenir Next LT Pro" panose="020B0504020202020204" pitchFamily="34" charset="0"/>
+              </a:rPr>
+              <a:t>ChatParticipant</a:t>
+            </a:r>
+            <a:r>
+              <a:rPr lang="en-US" sz="1100" dirty="0">
+                <a:latin typeface="Avenir Next LT Pro" panose="020B0504020202020204" pitchFamily="34" charset="0"/>
+              </a:rPr>
+              <a:t> (</a:t>
+            </a:r>
+            <a:r>
+              <a:rPr lang="en-US" sz="1100" dirty="0" err="1">
+                <a:latin typeface="Avenir Next LT Pro" panose="020B0504020202020204" pitchFamily="34" charset="0"/>
+              </a:rPr>
+              <a:t>userID</a:t>
+            </a:r>
+            <a:r>
+              <a:rPr lang="en-US" sz="1100" dirty="0">
+                <a:latin typeface="Avenir Next LT Pro" panose="020B0504020202020204" pitchFamily="34" charset="0"/>
+              </a:rPr>
+              <a:t> - Foreign)</a:t>
+            </a:r>
+          </a:p>
+          <a:p>
+            <a:pPr marL="228600" indent="-228600">
+              <a:buFont typeface="+mj-lt"/>
+              <a:buAutoNum type="arabicPeriod"/>
+            </a:pPr>
+            <a:r>
+              <a:rPr lang="en-US" sz="1100" dirty="0">
+                <a:latin typeface="Avenir Next LT Pro" panose="020B0504020202020204" pitchFamily="34" charset="0"/>
+              </a:rPr>
+              <a:t>User (</a:t>
+            </a:r>
+            <a:r>
+              <a:rPr lang="en-US" sz="1100" dirty="0" err="1">
+                <a:latin typeface="Avenir Next LT Pro" panose="020B0504020202020204" pitchFamily="34" charset="0"/>
+              </a:rPr>
+              <a:t>userID</a:t>
+            </a:r>
+            <a:r>
+              <a:rPr lang="en-US" sz="1100" dirty="0">
+                <a:latin typeface="Avenir Next LT Pro" panose="020B0504020202020204" pitchFamily="34" charset="0"/>
+              </a:rPr>
+              <a:t> - Primary) --------&gt; </a:t>
+            </a:r>
+            <a:r>
+              <a:rPr lang="en-US" sz="1100" dirty="0" err="1">
+                <a:latin typeface="Avenir Next LT Pro" panose="020B0504020202020204" pitchFamily="34" charset="0"/>
+              </a:rPr>
+              <a:t>ChatList</a:t>
+            </a:r>
+            <a:r>
+              <a:rPr lang="en-US" sz="1100" dirty="0">
+                <a:latin typeface="Avenir Next LT Pro" panose="020B0504020202020204" pitchFamily="34" charset="0"/>
+              </a:rPr>
+              <a:t> (</a:t>
+            </a:r>
+            <a:r>
+              <a:rPr lang="en-US" sz="1100" dirty="0" err="1">
+                <a:latin typeface="Avenir Next LT Pro" panose="020B0504020202020204" pitchFamily="34" charset="0"/>
+              </a:rPr>
+              <a:t>userID</a:t>
+            </a:r>
+            <a:r>
+              <a:rPr lang="en-US" sz="1100" dirty="0">
+                <a:latin typeface="Avenir Next LT Pro" panose="020B0504020202020204" pitchFamily="34" charset="0"/>
+              </a:rPr>
+              <a:t> - Foreign)</a:t>
+            </a:r>
+          </a:p>
+          <a:p>
+            <a:pPr marL="228600" indent="-228600">
+              <a:buFont typeface="+mj-lt"/>
+              <a:buAutoNum type="arabicPeriod"/>
+            </a:pPr>
+            <a:r>
+              <a:rPr lang="en-US" sz="1100" dirty="0">
+                <a:latin typeface="Avenir Next LT Pro" panose="020B0504020202020204" pitchFamily="34" charset="0"/>
+              </a:rPr>
+              <a:t>Chat (</a:t>
+            </a:r>
+            <a:r>
+              <a:rPr lang="en-US" sz="1100" dirty="0" err="1">
+                <a:latin typeface="Avenir Next LT Pro" panose="020B0504020202020204" pitchFamily="34" charset="0"/>
+              </a:rPr>
+              <a:t>chatID</a:t>
+            </a:r>
+            <a:r>
+              <a:rPr lang="en-US" sz="1100" dirty="0">
+                <a:latin typeface="Avenir Next LT Pro" panose="020B0504020202020204" pitchFamily="34" charset="0"/>
+              </a:rPr>
+              <a:t> - Primary) --------&gt; </a:t>
+            </a:r>
+            <a:r>
+              <a:rPr lang="en-US" sz="1100" dirty="0" err="1">
+                <a:latin typeface="Avenir Next LT Pro" panose="020B0504020202020204" pitchFamily="34" charset="0"/>
+              </a:rPr>
+              <a:t>ChatParticipant</a:t>
+            </a:r>
+            <a:r>
+              <a:rPr lang="en-US" sz="1100" dirty="0">
+                <a:latin typeface="Avenir Next LT Pro" panose="020B0504020202020204" pitchFamily="34" charset="0"/>
+              </a:rPr>
+              <a:t> (</a:t>
+            </a:r>
+            <a:r>
+              <a:rPr lang="en-US" sz="1100" dirty="0" err="1">
+                <a:latin typeface="Avenir Next LT Pro" panose="020B0504020202020204" pitchFamily="34" charset="0"/>
+              </a:rPr>
+              <a:t>chatID</a:t>
+            </a:r>
+            <a:r>
+              <a:rPr lang="en-US" sz="1100" dirty="0">
+                <a:latin typeface="Avenir Next LT Pro" panose="020B0504020202020204" pitchFamily="34" charset="0"/>
+              </a:rPr>
+              <a:t> - Foreign)</a:t>
+            </a:r>
+          </a:p>
+          <a:p>
+            <a:pPr marL="228600" indent="-228600">
+              <a:buFont typeface="+mj-lt"/>
+              <a:buAutoNum type="arabicPeriod"/>
+            </a:pPr>
+            <a:r>
+              <a:rPr lang="en-US" sz="1100" dirty="0">
+                <a:latin typeface="Avenir Next LT Pro" panose="020B0504020202020204" pitchFamily="34" charset="0"/>
+              </a:rPr>
+              <a:t>Chat (</a:t>
+            </a:r>
+            <a:r>
+              <a:rPr lang="en-US" sz="1100" dirty="0" err="1">
+                <a:latin typeface="Avenir Next LT Pro" panose="020B0504020202020204" pitchFamily="34" charset="0"/>
+              </a:rPr>
+              <a:t>chatID</a:t>
+            </a:r>
+            <a:r>
+              <a:rPr lang="en-US" sz="1100" dirty="0">
+                <a:latin typeface="Avenir Next LT Pro" panose="020B0504020202020204" pitchFamily="34" charset="0"/>
+              </a:rPr>
+              <a:t> - Primary) --------&gt; </a:t>
+            </a:r>
+            <a:r>
+              <a:rPr lang="en-US" sz="1100" dirty="0" err="1">
+                <a:latin typeface="Avenir Next LT Pro" panose="020B0504020202020204" pitchFamily="34" charset="0"/>
+              </a:rPr>
+              <a:t>ChatList</a:t>
+            </a:r>
+            <a:r>
+              <a:rPr lang="en-US" sz="1100" dirty="0">
+                <a:latin typeface="Avenir Next LT Pro" panose="020B0504020202020204" pitchFamily="34" charset="0"/>
+              </a:rPr>
+              <a:t> (</a:t>
+            </a:r>
+            <a:r>
+              <a:rPr lang="en-US" sz="1100" dirty="0" err="1">
+                <a:latin typeface="Avenir Next LT Pro" panose="020B0504020202020204" pitchFamily="34" charset="0"/>
+              </a:rPr>
+              <a:t>chatID</a:t>
+            </a:r>
+            <a:r>
+              <a:rPr lang="en-US" sz="1100" dirty="0">
+                <a:latin typeface="Avenir Next LT Pro" panose="020B0504020202020204" pitchFamily="34" charset="0"/>
+              </a:rPr>
+              <a:t> - Foreign)</a:t>
+            </a:r>
+          </a:p>
+          <a:p>
+            <a:pPr marL="228600" indent="-228600">
+              <a:buFont typeface="+mj-lt"/>
+              <a:buAutoNum type="arabicPeriod"/>
+            </a:pPr>
+            <a:r>
+              <a:rPr lang="en-US" sz="1100" dirty="0">
+                <a:latin typeface="Avenir Next LT Pro" panose="020B0504020202020204" pitchFamily="34" charset="0"/>
+              </a:rPr>
+              <a:t>Chat (</a:t>
+            </a:r>
+            <a:r>
+              <a:rPr lang="en-US" sz="1100" dirty="0" err="1">
+                <a:latin typeface="Avenir Next LT Pro" panose="020B0504020202020204" pitchFamily="34" charset="0"/>
+              </a:rPr>
+              <a:t>chatID</a:t>
+            </a:r>
+            <a:r>
+              <a:rPr lang="en-US" sz="1100" dirty="0">
+                <a:latin typeface="Avenir Next LT Pro" panose="020B0504020202020204" pitchFamily="34" charset="0"/>
+              </a:rPr>
+              <a:t> - Primary) --------&gt; Text (</a:t>
+            </a:r>
+            <a:r>
+              <a:rPr lang="en-US" sz="1100" dirty="0" err="1">
+                <a:latin typeface="Avenir Next LT Pro" panose="020B0504020202020204" pitchFamily="34" charset="0"/>
+              </a:rPr>
+              <a:t>chatID</a:t>
+            </a:r>
+            <a:r>
+              <a:rPr lang="en-US" sz="1100" dirty="0">
+                <a:latin typeface="Avenir Next LT Pro" panose="020B0504020202020204" pitchFamily="34" charset="0"/>
+              </a:rPr>
+              <a:t> - Foreign)</a:t>
+            </a:r>
+          </a:p>
+          <a:p>
+            <a:pPr marL="228600" indent="-228600">
+              <a:buFont typeface="+mj-lt"/>
+              <a:buAutoNum type="arabicPeriod"/>
+            </a:pPr>
+            <a:r>
+              <a:rPr lang="en-US" sz="1100" dirty="0">
+                <a:latin typeface="Avenir Next LT Pro" panose="020B0504020202020204" pitchFamily="34" charset="0"/>
+              </a:rPr>
+              <a:t>Chat (</a:t>
+            </a:r>
+            <a:r>
+              <a:rPr lang="en-US" sz="1100" dirty="0" err="1">
+                <a:latin typeface="Avenir Next LT Pro" panose="020B0504020202020204" pitchFamily="34" charset="0"/>
+              </a:rPr>
+              <a:t>chatID</a:t>
+            </a:r>
+            <a:r>
+              <a:rPr lang="en-US" sz="1100" dirty="0">
+                <a:latin typeface="Avenir Next LT Pro" panose="020B0504020202020204" pitchFamily="34" charset="0"/>
+              </a:rPr>
+              <a:t> - Primary) --------&gt; File (</a:t>
+            </a:r>
+            <a:r>
+              <a:rPr lang="en-US" sz="1100" dirty="0" err="1">
+                <a:latin typeface="Avenir Next LT Pro" panose="020B0504020202020204" pitchFamily="34" charset="0"/>
+              </a:rPr>
+              <a:t>chatID</a:t>
+            </a:r>
+            <a:r>
+              <a:rPr lang="en-US" sz="1100" dirty="0">
+                <a:latin typeface="Avenir Next LT Pro" panose="020B0504020202020204" pitchFamily="34" charset="0"/>
+              </a:rPr>
+              <a:t> - Foreign)</a:t>
+            </a:r>
+          </a:p>
+          <a:p>
+            <a:pPr marL="228600" indent="-228600">
+              <a:buFont typeface="+mj-lt"/>
+              <a:buAutoNum type="arabicPeriod"/>
+            </a:pPr>
+            <a:r>
+              <a:rPr lang="en-US" sz="1100" dirty="0">
+                <a:latin typeface="Avenir Next LT Pro" panose="020B0504020202020204" pitchFamily="34" charset="0"/>
+              </a:rPr>
+              <a:t>Chat (</a:t>
+            </a:r>
+            <a:r>
+              <a:rPr lang="en-US" sz="1100" dirty="0" err="1">
+                <a:latin typeface="Avenir Next LT Pro" panose="020B0504020202020204" pitchFamily="34" charset="0"/>
+              </a:rPr>
+              <a:t>chatID</a:t>
+            </a:r>
+            <a:r>
+              <a:rPr lang="en-US" sz="1100" dirty="0">
+                <a:latin typeface="Avenir Next LT Pro" panose="020B0504020202020204" pitchFamily="34" charset="0"/>
+              </a:rPr>
+              <a:t> - Primary) --------&gt; Address (</a:t>
+            </a:r>
+            <a:r>
+              <a:rPr lang="en-US" sz="1100" dirty="0" err="1">
+                <a:latin typeface="Avenir Next LT Pro" panose="020B0504020202020204" pitchFamily="34" charset="0"/>
+              </a:rPr>
+              <a:t>chatID</a:t>
+            </a:r>
+            <a:r>
+              <a:rPr lang="en-US" sz="1100" dirty="0">
+                <a:latin typeface="Avenir Next LT Pro" panose="020B0504020202020204" pitchFamily="34" charset="0"/>
+              </a:rPr>
+              <a:t> - Foreign)</a:t>
+            </a:r>
+          </a:p>
+          <a:p>
+            <a:pPr marL="228600" indent="-228600">
+              <a:buFont typeface="+mj-lt"/>
+              <a:buAutoNum type="arabicPeriod"/>
+            </a:pPr>
+            <a:r>
+              <a:rPr lang="en-US" sz="1100" dirty="0">
+                <a:latin typeface="Avenir Next LT Pro" panose="020B0504020202020204" pitchFamily="34" charset="0"/>
+              </a:rPr>
+              <a:t>Chat (</a:t>
+            </a:r>
+            <a:r>
+              <a:rPr lang="en-US" sz="1100" dirty="0" err="1">
+                <a:latin typeface="Avenir Next LT Pro" panose="020B0504020202020204" pitchFamily="34" charset="0"/>
+              </a:rPr>
+              <a:t>chatID</a:t>
+            </a:r>
+            <a:r>
+              <a:rPr lang="en-US" sz="1100" dirty="0">
+                <a:latin typeface="Avenir Next LT Pro" panose="020B0504020202020204" pitchFamily="34" charset="0"/>
+              </a:rPr>
+              <a:t> - Primary) --------&gt; Meeting (</a:t>
+            </a:r>
+            <a:r>
+              <a:rPr lang="en-US" sz="1100" dirty="0" err="1">
+                <a:latin typeface="Avenir Next LT Pro" panose="020B0504020202020204" pitchFamily="34" charset="0"/>
+              </a:rPr>
+              <a:t>chatID</a:t>
+            </a:r>
+            <a:r>
+              <a:rPr lang="en-US" sz="1100" dirty="0">
+                <a:latin typeface="Avenir Next LT Pro" panose="020B0504020202020204" pitchFamily="34" charset="0"/>
+              </a:rPr>
+              <a:t> - Foreign)</a:t>
+            </a:r>
+          </a:p>
+          <a:p>
+            <a:pPr marL="228600" indent="-228600">
+              <a:buFont typeface="+mj-lt"/>
+              <a:buAutoNum type="arabicPeriod"/>
+            </a:pPr>
+            <a:r>
+              <a:rPr lang="en-US" sz="1100" dirty="0">
+                <a:latin typeface="Avenir Next LT Pro" panose="020B0504020202020204" pitchFamily="34" charset="0"/>
+              </a:rPr>
+              <a:t>Chat (</a:t>
+            </a:r>
+            <a:r>
+              <a:rPr lang="en-US" sz="1100" dirty="0" err="1">
+                <a:latin typeface="Avenir Next LT Pro" panose="020B0504020202020204" pitchFamily="34" charset="0"/>
+              </a:rPr>
+              <a:t>chatID</a:t>
+            </a:r>
+            <a:r>
+              <a:rPr lang="en-US" sz="1100" dirty="0">
+                <a:latin typeface="Avenir Next LT Pro" panose="020B0504020202020204" pitchFamily="34" charset="0"/>
+              </a:rPr>
+              <a:t> - Primary) --------&gt; Payment (</a:t>
+            </a:r>
+            <a:r>
+              <a:rPr lang="en-US" sz="1100" dirty="0" err="1">
+                <a:latin typeface="Avenir Next LT Pro" panose="020B0504020202020204" pitchFamily="34" charset="0"/>
+              </a:rPr>
+              <a:t>chatID</a:t>
+            </a:r>
+            <a:r>
+              <a:rPr lang="en-US" sz="1100" dirty="0">
+                <a:latin typeface="Avenir Next LT Pro" panose="020B0504020202020204" pitchFamily="34" charset="0"/>
+              </a:rPr>
+              <a:t> - Foreign)</a:t>
+            </a:r>
+          </a:p>
+          <a:p>
+            <a:pPr marL="228600" indent="-228600">
+              <a:buFont typeface="+mj-lt"/>
+              <a:buAutoNum type="arabicPeriod"/>
+            </a:pPr>
+            <a:r>
+              <a:rPr lang="en-US" sz="1100" dirty="0">
+                <a:latin typeface="Avenir Next LT Pro" panose="020B0504020202020204" pitchFamily="34" charset="0"/>
+              </a:rPr>
+              <a:t>Chat (</a:t>
+            </a:r>
+            <a:r>
+              <a:rPr lang="en-US" sz="1100" dirty="0" err="1">
+                <a:latin typeface="Avenir Next LT Pro" panose="020B0504020202020204" pitchFamily="34" charset="0"/>
+              </a:rPr>
+              <a:t>chatID</a:t>
+            </a:r>
+            <a:r>
+              <a:rPr lang="en-US" sz="1100" dirty="0">
+                <a:latin typeface="Avenir Next LT Pro" panose="020B0504020202020204" pitchFamily="34" charset="0"/>
+              </a:rPr>
+              <a:t> - Primary) --------&gt; </a:t>
+            </a:r>
+            <a:r>
+              <a:rPr lang="en-US" sz="1100" dirty="0" err="1">
+                <a:latin typeface="Avenir Next LT Pro" panose="020B0504020202020204" pitchFamily="34" charset="0"/>
+              </a:rPr>
+              <a:t>CallUp</a:t>
+            </a:r>
+            <a:r>
+              <a:rPr lang="en-US" sz="1100" dirty="0">
+                <a:latin typeface="Avenir Next LT Pro" panose="020B0504020202020204" pitchFamily="34" charset="0"/>
+              </a:rPr>
+              <a:t> (</a:t>
+            </a:r>
+            <a:r>
+              <a:rPr lang="en-US" sz="1100" dirty="0" err="1">
+                <a:latin typeface="Avenir Next LT Pro" panose="020B0504020202020204" pitchFamily="34" charset="0"/>
+              </a:rPr>
+              <a:t>chatID</a:t>
+            </a:r>
+            <a:r>
+              <a:rPr lang="en-US" sz="1100" dirty="0">
+                <a:latin typeface="Avenir Next LT Pro" panose="020B0504020202020204" pitchFamily="34" charset="0"/>
+              </a:rPr>
+              <a:t> - Foreign)</a:t>
+            </a:r>
+          </a:p>
+          <a:p>
+            <a:pPr marL="228600" indent="-228600">
+              <a:buFont typeface="+mj-lt"/>
+              <a:buAutoNum type="arabicPeriod"/>
+            </a:pPr>
+            <a:r>
+              <a:rPr lang="en-US" sz="1100" dirty="0" err="1">
+                <a:latin typeface="Avenir Next LT Pro" panose="020B0504020202020204" pitchFamily="34" charset="0"/>
+              </a:rPr>
+              <a:t>ChatParticipant</a:t>
+            </a:r>
+            <a:r>
+              <a:rPr lang="en-US" sz="1100" dirty="0">
+                <a:latin typeface="Avenir Next LT Pro" panose="020B0504020202020204" pitchFamily="34" charset="0"/>
+              </a:rPr>
+              <a:t> (</a:t>
+            </a:r>
+            <a:r>
+              <a:rPr lang="en-US" sz="1100" dirty="0" err="1">
+                <a:latin typeface="Avenir Next LT Pro" panose="020B0504020202020204" pitchFamily="34" charset="0"/>
+              </a:rPr>
+              <a:t>userID</a:t>
+            </a:r>
+            <a:r>
+              <a:rPr lang="en-US" sz="1100" dirty="0">
+                <a:latin typeface="Avenir Next LT Pro" panose="020B0504020202020204" pitchFamily="34" charset="0"/>
+              </a:rPr>
+              <a:t> - Foreign) --------&gt; User (</a:t>
+            </a:r>
+            <a:r>
+              <a:rPr lang="en-US" sz="1100" dirty="0" err="1">
+                <a:latin typeface="Avenir Next LT Pro" panose="020B0504020202020204" pitchFamily="34" charset="0"/>
+              </a:rPr>
+              <a:t>userID</a:t>
+            </a:r>
+            <a:r>
+              <a:rPr lang="en-US" sz="1100" dirty="0">
+                <a:latin typeface="Avenir Next LT Pro" panose="020B0504020202020204" pitchFamily="34" charset="0"/>
+              </a:rPr>
+              <a:t> - Primary)</a:t>
+            </a:r>
+          </a:p>
+          <a:p>
+            <a:pPr marL="228600" indent="-228600">
+              <a:buFont typeface="+mj-lt"/>
+              <a:buAutoNum type="arabicPeriod"/>
+            </a:pPr>
+            <a:r>
+              <a:rPr lang="en-US" sz="1100" dirty="0" err="1">
+                <a:latin typeface="Avenir Next LT Pro" panose="020B0504020202020204" pitchFamily="34" charset="0"/>
+              </a:rPr>
+              <a:t>ChatParticipant</a:t>
+            </a:r>
+            <a:r>
+              <a:rPr lang="en-US" sz="1100" dirty="0">
+                <a:latin typeface="Avenir Next LT Pro" panose="020B0504020202020204" pitchFamily="34" charset="0"/>
+              </a:rPr>
+              <a:t> (</a:t>
+            </a:r>
+            <a:r>
+              <a:rPr lang="en-US" sz="1100" dirty="0" err="1">
+                <a:latin typeface="Avenir Next LT Pro" panose="020B0504020202020204" pitchFamily="34" charset="0"/>
+              </a:rPr>
+              <a:t>chatID</a:t>
+            </a:r>
+            <a:r>
+              <a:rPr lang="en-US" sz="1100" dirty="0">
+                <a:latin typeface="Avenir Next LT Pro" panose="020B0504020202020204" pitchFamily="34" charset="0"/>
+              </a:rPr>
+              <a:t> - Foreign) --------&gt; Chat (</a:t>
+            </a:r>
+            <a:r>
+              <a:rPr lang="en-US" sz="1100" dirty="0" err="1">
+                <a:latin typeface="Avenir Next LT Pro" panose="020B0504020202020204" pitchFamily="34" charset="0"/>
+              </a:rPr>
+              <a:t>chatID</a:t>
+            </a:r>
+            <a:r>
+              <a:rPr lang="en-US" sz="1100" dirty="0">
+                <a:latin typeface="Avenir Next LT Pro" panose="020B0504020202020204" pitchFamily="34" charset="0"/>
+              </a:rPr>
+              <a:t> - Primary)</a:t>
+            </a:r>
+          </a:p>
+          <a:p>
+            <a:pPr marL="228600" indent="-228600">
+              <a:buFont typeface="+mj-lt"/>
+              <a:buAutoNum type="arabicPeriod"/>
+            </a:pPr>
+            <a:r>
+              <a:rPr lang="en-US" sz="1100" dirty="0" err="1">
+                <a:latin typeface="Avenir Next LT Pro" panose="020B0504020202020204" pitchFamily="34" charset="0"/>
+              </a:rPr>
+              <a:t>ChatList</a:t>
+            </a:r>
+            <a:r>
+              <a:rPr lang="en-US" sz="1100" dirty="0">
+                <a:latin typeface="Avenir Next LT Pro" panose="020B0504020202020204" pitchFamily="34" charset="0"/>
+              </a:rPr>
+              <a:t> (</a:t>
+            </a:r>
+            <a:r>
+              <a:rPr lang="en-US" sz="1100" dirty="0" err="1">
+                <a:latin typeface="Avenir Next LT Pro" panose="020B0504020202020204" pitchFamily="34" charset="0"/>
+              </a:rPr>
+              <a:t>userID</a:t>
+            </a:r>
+            <a:r>
+              <a:rPr lang="en-US" sz="1100" dirty="0">
+                <a:latin typeface="Avenir Next LT Pro" panose="020B0504020202020204" pitchFamily="34" charset="0"/>
+              </a:rPr>
+              <a:t> - Foreign) --------&gt; User (</a:t>
+            </a:r>
+            <a:r>
+              <a:rPr lang="en-US" sz="1100" dirty="0" err="1">
+                <a:latin typeface="Avenir Next LT Pro" panose="020B0504020202020204" pitchFamily="34" charset="0"/>
+              </a:rPr>
+              <a:t>userID</a:t>
+            </a:r>
+            <a:r>
+              <a:rPr lang="en-US" sz="1100" dirty="0">
+                <a:latin typeface="Avenir Next LT Pro" panose="020B0504020202020204" pitchFamily="34" charset="0"/>
+              </a:rPr>
+              <a:t> - Primary)</a:t>
+            </a:r>
+          </a:p>
+          <a:p>
+            <a:pPr marL="228600" indent="-228600">
+              <a:buFont typeface="+mj-lt"/>
+              <a:buAutoNum type="arabicPeriod"/>
+            </a:pPr>
+            <a:r>
+              <a:rPr lang="en-US" sz="1100" dirty="0" err="1">
+                <a:latin typeface="Avenir Next LT Pro" panose="020B0504020202020204" pitchFamily="34" charset="0"/>
+              </a:rPr>
+              <a:t>ChatList</a:t>
+            </a:r>
+            <a:r>
+              <a:rPr lang="en-US" sz="1100" dirty="0">
+                <a:latin typeface="Avenir Next LT Pro" panose="020B0504020202020204" pitchFamily="34" charset="0"/>
+              </a:rPr>
+              <a:t> (</a:t>
+            </a:r>
+            <a:r>
+              <a:rPr lang="en-US" sz="1100" dirty="0" err="1">
+                <a:latin typeface="Avenir Next LT Pro" panose="020B0504020202020204" pitchFamily="34" charset="0"/>
+              </a:rPr>
+              <a:t>chatID</a:t>
+            </a:r>
+            <a:r>
+              <a:rPr lang="en-US" sz="1100" dirty="0">
+                <a:latin typeface="Avenir Next LT Pro" panose="020B0504020202020204" pitchFamily="34" charset="0"/>
+              </a:rPr>
+              <a:t> - Foreign) --------&gt; Chat (</a:t>
+            </a:r>
+            <a:r>
+              <a:rPr lang="en-US" sz="1100" dirty="0" err="1">
+                <a:latin typeface="Avenir Next LT Pro" panose="020B0504020202020204" pitchFamily="34" charset="0"/>
+              </a:rPr>
+              <a:t>chatID</a:t>
+            </a:r>
+            <a:r>
+              <a:rPr lang="en-US" sz="1100" dirty="0">
+                <a:latin typeface="Avenir Next LT Pro" panose="020B0504020202020204" pitchFamily="34" charset="0"/>
+              </a:rPr>
+              <a:t> - Primary)</a:t>
+            </a:r>
+          </a:p>
+          <a:p>
+            <a:pPr marL="228600" indent="-228600">
+              <a:buFont typeface="+mj-lt"/>
+              <a:buAutoNum type="arabicPeriod"/>
+            </a:pPr>
+            <a:r>
+              <a:rPr lang="en-US" sz="1100" dirty="0">
+                <a:latin typeface="Avenir Next LT Pro" panose="020B0504020202020204" pitchFamily="34" charset="0"/>
+              </a:rPr>
+              <a:t>Text (</a:t>
+            </a:r>
+            <a:r>
+              <a:rPr lang="en-US" sz="1100" dirty="0" err="1">
+                <a:latin typeface="Avenir Next LT Pro" panose="020B0504020202020204" pitchFamily="34" charset="0"/>
+              </a:rPr>
+              <a:t>chatID</a:t>
+            </a:r>
+            <a:r>
+              <a:rPr lang="en-US" sz="1100" dirty="0">
+                <a:latin typeface="Avenir Next LT Pro" panose="020B0504020202020204" pitchFamily="34" charset="0"/>
+              </a:rPr>
+              <a:t> - Foreign) --------&gt; Chat (</a:t>
+            </a:r>
+            <a:r>
+              <a:rPr lang="en-US" sz="1100" dirty="0" err="1">
+                <a:latin typeface="Avenir Next LT Pro" panose="020B0504020202020204" pitchFamily="34" charset="0"/>
+              </a:rPr>
+              <a:t>chatID</a:t>
+            </a:r>
+            <a:r>
+              <a:rPr lang="en-US" sz="1100" dirty="0">
+                <a:latin typeface="Avenir Next LT Pro" panose="020B0504020202020204" pitchFamily="34" charset="0"/>
+              </a:rPr>
+              <a:t> - Primary)</a:t>
+            </a:r>
+          </a:p>
+          <a:p>
+            <a:pPr marL="228600" indent="-228600">
+              <a:buFont typeface="+mj-lt"/>
+              <a:buAutoNum type="arabicPeriod"/>
+            </a:pPr>
+            <a:r>
+              <a:rPr lang="en-US" sz="1100" dirty="0">
+                <a:latin typeface="Avenir Next LT Pro" panose="020B0504020202020204" pitchFamily="34" charset="0"/>
+              </a:rPr>
+              <a:t>Address (</a:t>
+            </a:r>
+            <a:r>
+              <a:rPr lang="en-US" sz="1100" dirty="0" err="1">
+                <a:latin typeface="Avenir Next LT Pro" panose="020B0504020202020204" pitchFamily="34" charset="0"/>
+              </a:rPr>
+              <a:t>chatID</a:t>
+            </a:r>
+            <a:r>
+              <a:rPr lang="en-US" sz="1100" dirty="0">
+                <a:latin typeface="Avenir Next LT Pro" panose="020B0504020202020204" pitchFamily="34" charset="0"/>
+              </a:rPr>
+              <a:t> - Foreign) --------&gt; Chat (</a:t>
+            </a:r>
+            <a:r>
+              <a:rPr lang="en-US" sz="1100" dirty="0" err="1">
+                <a:latin typeface="Avenir Next LT Pro" panose="020B0504020202020204" pitchFamily="34" charset="0"/>
+              </a:rPr>
+              <a:t>chatID</a:t>
+            </a:r>
+            <a:r>
+              <a:rPr lang="en-US" sz="1100" dirty="0">
+                <a:latin typeface="Avenir Next LT Pro" panose="020B0504020202020204" pitchFamily="34" charset="0"/>
+              </a:rPr>
+              <a:t> - Primary)</a:t>
+            </a:r>
+          </a:p>
+          <a:p>
+            <a:pPr marL="228600" indent="-228600">
+              <a:buFont typeface="+mj-lt"/>
+              <a:buAutoNum type="arabicPeriod"/>
+            </a:pPr>
+            <a:r>
+              <a:rPr lang="en-US" sz="1100" dirty="0">
+                <a:latin typeface="Avenir Next LT Pro" panose="020B0504020202020204" pitchFamily="34" charset="0"/>
+              </a:rPr>
+              <a:t>File (</a:t>
+            </a:r>
+            <a:r>
+              <a:rPr lang="en-US" sz="1100" dirty="0" err="1">
+                <a:latin typeface="Avenir Next LT Pro" panose="020B0504020202020204" pitchFamily="34" charset="0"/>
+              </a:rPr>
+              <a:t>chatID</a:t>
+            </a:r>
+            <a:r>
+              <a:rPr lang="en-US" sz="1100" dirty="0">
+                <a:latin typeface="Avenir Next LT Pro" panose="020B0504020202020204" pitchFamily="34" charset="0"/>
+              </a:rPr>
+              <a:t> - Foreign) --------&gt; Chat (</a:t>
+            </a:r>
+            <a:r>
+              <a:rPr lang="en-US" sz="1100" dirty="0" err="1">
+                <a:latin typeface="Avenir Next LT Pro" panose="020B0504020202020204" pitchFamily="34" charset="0"/>
+              </a:rPr>
+              <a:t>chatID</a:t>
+            </a:r>
+            <a:r>
+              <a:rPr lang="en-US" sz="1100" dirty="0">
+                <a:latin typeface="Avenir Next LT Pro" panose="020B0504020202020204" pitchFamily="34" charset="0"/>
+              </a:rPr>
+              <a:t> - Primary)</a:t>
+            </a:r>
+          </a:p>
+          <a:p>
+            <a:pPr marL="228600" indent="-228600">
+              <a:buFont typeface="+mj-lt"/>
+              <a:buAutoNum type="arabicPeriod"/>
+            </a:pPr>
+            <a:r>
+              <a:rPr lang="en-US" sz="1100" dirty="0">
+                <a:latin typeface="Avenir Next LT Pro" panose="020B0504020202020204" pitchFamily="34" charset="0"/>
+              </a:rPr>
+              <a:t>Meeting (</a:t>
+            </a:r>
+            <a:r>
+              <a:rPr lang="en-US" sz="1100" dirty="0" err="1">
+                <a:latin typeface="Avenir Next LT Pro" panose="020B0504020202020204" pitchFamily="34" charset="0"/>
+              </a:rPr>
+              <a:t>chatID</a:t>
+            </a:r>
+            <a:r>
+              <a:rPr lang="en-US" sz="1100" dirty="0">
+                <a:latin typeface="Avenir Next LT Pro" panose="020B0504020202020204" pitchFamily="34" charset="0"/>
+              </a:rPr>
+              <a:t> - Foreign) --------&gt; Chat (</a:t>
+            </a:r>
+            <a:r>
+              <a:rPr lang="en-US" sz="1100" dirty="0" err="1">
+                <a:latin typeface="Avenir Next LT Pro" panose="020B0504020202020204" pitchFamily="34" charset="0"/>
+              </a:rPr>
+              <a:t>chatID</a:t>
+            </a:r>
+            <a:r>
+              <a:rPr lang="en-US" sz="1100" dirty="0">
+                <a:latin typeface="Avenir Next LT Pro" panose="020B0504020202020204" pitchFamily="34" charset="0"/>
+              </a:rPr>
+              <a:t> - Primary)</a:t>
+            </a:r>
+          </a:p>
+          <a:p>
+            <a:pPr marL="228600" indent="-228600">
+              <a:buFont typeface="+mj-lt"/>
+              <a:buAutoNum type="arabicPeriod"/>
+            </a:pPr>
+            <a:r>
+              <a:rPr lang="en-US" sz="1100" dirty="0">
+                <a:latin typeface="Avenir Next LT Pro" panose="020B0504020202020204" pitchFamily="34" charset="0"/>
+              </a:rPr>
+              <a:t>Payment (</a:t>
+            </a:r>
+            <a:r>
+              <a:rPr lang="en-US" sz="1100" dirty="0" err="1">
+                <a:latin typeface="Avenir Next LT Pro" panose="020B0504020202020204" pitchFamily="34" charset="0"/>
+              </a:rPr>
+              <a:t>chatID</a:t>
+            </a:r>
+            <a:r>
+              <a:rPr lang="en-US" sz="1100" dirty="0">
+                <a:latin typeface="Avenir Next LT Pro" panose="020B0504020202020204" pitchFamily="34" charset="0"/>
+              </a:rPr>
+              <a:t> - Foreign) --------&gt; Chat (</a:t>
+            </a:r>
+            <a:r>
+              <a:rPr lang="en-US" sz="1100" dirty="0" err="1">
+                <a:latin typeface="Avenir Next LT Pro" panose="020B0504020202020204" pitchFamily="34" charset="0"/>
+              </a:rPr>
+              <a:t>chatID</a:t>
+            </a:r>
+            <a:r>
+              <a:rPr lang="en-US" sz="1100" dirty="0">
+                <a:latin typeface="Avenir Next LT Pro" panose="020B0504020202020204" pitchFamily="34" charset="0"/>
+              </a:rPr>
+              <a:t> - Primary)</a:t>
+            </a:r>
+          </a:p>
+          <a:p>
+            <a:pPr marL="228600" indent="-228600">
+              <a:buFont typeface="+mj-lt"/>
+              <a:buAutoNum type="arabicPeriod"/>
+            </a:pPr>
+            <a:r>
+              <a:rPr lang="en-US" sz="1100" dirty="0" err="1">
+                <a:latin typeface="Avenir Next LT Pro" panose="020B0504020202020204" pitchFamily="34" charset="0"/>
+              </a:rPr>
+              <a:t>CallUp</a:t>
+            </a:r>
+            <a:r>
+              <a:rPr lang="en-US" sz="1100" dirty="0">
+                <a:latin typeface="Avenir Next LT Pro" panose="020B0504020202020204" pitchFamily="34" charset="0"/>
+              </a:rPr>
+              <a:t> (</a:t>
+            </a:r>
+            <a:r>
+              <a:rPr lang="en-US" sz="1100" dirty="0" err="1">
+                <a:latin typeface="Avenir Next LT Pro" panose="020B0504020202020204" pitchFamily="34" charset="0"/>
+              </a:rPr>
+              <a:t>chatID</a:t>
+            </a:r>
+            <a:r>
+              <a:rPr lang="en-US" sz="1100" dirty="0">
+                <a:latin typeface="Avenir Next LT Pro" panose="020B0504020202020204" pitchFamily="34" charset="0"/>
+              </a:rPr>
+              <a:t> - Foreign) --------&gt; Chat (</a:t>
+            </a:r>
+            <a:r>
+              <a:rPr lang="en-US" sz="1100" dirty="0" err="1">
+                <a:latin typeface="Avenir Next LT Pro" panose="020B0504020202020204" pitchFamily="34" charset="0"/>
+              </a:rPr>
+              <a:t>chatID</a:t>
+            </a:r>
+            <a:r>
+              <a:rPr lang="en-US" sz="1100" dirty="0">
+                <a:latin typeface="Avenir Next LT Pro" panose="020B0504020202020204" pitchFamily="34" charset="0"/>
+              </a:rPr>
+              <a:t> - Primary)</a:t>
+            </a:r>
+          </a:p>
+          <a:p>
+            <a:endParaRPr lang="en-US" sz="1100" dirty="0">
+              <a:latin typeface="Avenir Next LT Pro" panose="020B0504020202020204" pitchFamily="34" charset="0"/>
+            </a:endParaRPr>
           </a:p>
         </p:txBody>
       </p:sp>
@@ -13859,23 +14716,6 @@
 </file>
 
 <file path=customXml/item1.xml><?xml version="1.0" encoding="utf-8"?>
-<p:properties xmlns:p="http://schemas.microsoft.com/office/2006/metadata/properties" xmlns:xsi="http://www.w3.org/2001/XMLSchema-instance" xmlns:pc="http://schemas.microsoft.com/office/infopath/2007/PartnerControls">
-  <documentManagement>
-    <_activity xmlns="0e1bb11d-1fe8-4e80-a80d-c671e8cd2a50" xsi:nil="true"/>
-  </documentManagement>
-</p:properties>
-</file>
-
-<file path=customXml/item2.xml><?xml version="1.0" encoding="utf-8"?>
-<?mso-contentType ?>
-<FormTemplates xmlns="http://schemas.microsoft.com/sharepoint/v3/contenttype/forms">
-  <Display>DocumentLibraryForm</Display>
-  <Edit>DocumentLibraryForm</Edit>
-  <New>DocumentLibraryForm</New>
-</FormTemplates>
-</file>
-
-<file path=customXml/item3.xml><?xml version="1.0" encoding="utf-8"?>
 <ct:contentTypeSchema xmlns:ct="http://schemas.microsoft.com/office/2006/metadata/contentType" xmlns:ma="http://schemas.microsoft.com/office/2006/metadata/properties/metaAttributes" ct:_="" ma:_="" ma:contentTypeName="Document" ma:contentTypeID="0x010100A855378936633F46935DE081F3F0A723" ma:contentTypeVersion="14" ma:contentTypeDescription="Create a new document." ma:contentTypeScope="" ma:versionID="55f1e6ab26213e900d3ea6b73674690f">
   <xsd:schema xmlns:xsd="http://www.w3.org/2001/XMLSchema" xmlns:xs="http://www.w3.org/2001/XMLSchema" xmlns:p="http://schemas.microsoft.com/office/2006/metadata/properties" xmlns:ns3="0e1bb11d-1fe8-4e80-a80d-c671e8cd2a50" targetNamespace="http://schemas.microsoft.com/office/2006/metadata/properties" ma:root="true" ma:fieldsID="cb5bac23893b177075308ae0464414f8" ns3:_="">
     <xsd:import namespace="0e1bb11d-1fe8-4e80-a80d-c671e8cd2a50"/>
@@ -14083,31 +14923,24 @@
 </ct:contentTypeSchema>
 </file>
 
-<file path=customXml/itemProps1.xml><?xml version="1.0" encoding="utf-8"?>
-<ds:datastoreItem xmlns:ds="http://schemas.openxmlformats.org/officeDocument/2006/customXml" ds:itemID="{EAC5C5E7-64B2-47F3-84A2-5A4A99E0956D}">
-  <ds:schemaRefs>
-    <ds:schemaRef ds:uri="http://schemas.microsoft.com/office/2006/metadata/properties"/>
-    <ds:schemaRef ds:uri="http://schemas.microsoft.com/office/infopath/2007/PartnerControls"/>
-    <ds:schemaRef ds:uri="http://purl.org/dc/elements/1.1/"/>
-    <ds:schemaRef ds:uri="http://schemas.microsoft.com/office/2006/documentManagement/types"/>
-    <ds:schemaRef ds:uri="http://www.w3.org/XML/1998/namespace"/>
-    <ds:schemaRef ds:uri="http://purl.org/dc/terms/"/>
-    <ds:schemaRef ds:uri="http://purl.org/dc/dcmitype/"/>
-    <ds:schemaRef ds:uri="0e1bb11d-1fe8-4e80-a80d-c671e8cd2a50"/>
-    <ds:schemaRef ds:uri="http://schemas.openxmlformats.org/package/2006/metadata/core-properties"/>
-  </ds:schemaRefs>
-</ds:datastoreItem>
+<file path=customXml/item2.xml><?xml version="1.0" encoding="utf-8"?>
+<?mso-contentType ?>
+<FormTemplates xmlns="http://schemas.microsoft.com/sharepoint/v3/contenttype/forms">
+  <Display>DocumentLibraryForm</Display>
+  <Edit>DocumentLibraryForm</Edit>
+  <New>DocumentLibraryForm</New>
+</FormTemplates>
 </file>
 
-<file path=customXml/itemProps2.xml><?xml version="1.0" encoding="utf-8"?>
-<ds:datastoreItem xmlns:ds="http://schemas.openxmlformats.org/officeDocument/2006/customXml" ds:itemID="{D9A29AA5-5937-490C-A495-D5C320512737}">
-  <ds:schemaRefs>
-    <ds:schemaRef ds:uri="http://schemas.microsoft.com/sharepoint/v3/contenttype/forms"/>
-  </ds:schemaRefs>
-</ds:datastoreItem>
+<file path=customXml/item3.xml><?xml version="1.0" encoding="utf-8"?>
+<p:properties xmlns:p="http://schemas.microsoft.com/office/2006/metadata/properties" xmlns:xsi="http://www.w3.org/2001/XMLSchema-instance" xmlns:pc="http://schemas.microsoft.com/office/infopath/2007/PartnerControls">
+  <documentManagement>
+    <_activity xmlns="0e1bb11d-1fe8-4e80-a80d-c671e8cd2a50" xsi:nil="true"/>
+  </documentManagement>
+</p:properties>
 </file>
 
-<file path=customXml/itemProps3.xml><?xml version="1.0" encoding="utf-8"?>
+<file path=customXml/itemProps1.xml><?xml version="1.0" encoding="utf-8"?>
 <ds:datastoreItem xmlns:ds="http://schemas.openxmlformats.org/officeDocument/2006/customXml" ds:itemID="{7B2E56D0-A161-47EC-9D87-E508F7ED6741}">
   <ds:schemaRefs>
     <ds:schemaRef ds:uri="http://schemas.microsoft.com/office/2006/metadata/contentType"/>
@@ -14123,4 +14956,28 @@
     <ds:schemaRef ds:uri="http://schemas.microsoft.com/internal/obd"/>
   </ds:schemaRefs>
 </ds:datastoreItem>
+</file>
+
+<file path=customXml/itemProps2.xml><?xml version="1.0" encoding="utf-8"?>
+<ds:datastoreItem xmlns:ds="http://schemas.openxmlformats.org/officeDocument/2006/customXml" ds:itemID="{D9A29AA5-5937-490C-A495-D5C320512737}">
+  <ds:schemaRefs>
+    <ds:schemaRef ds:uri="http://schemas.microsoft.com/sharepoint/v3/contenttype/forms"/>
+  </ds:schemaRefs>
+</ds:datastoreItem>
+</file>
+
+<file path=customXml/itemProps3.xml><?xml version="1.0" encoding="utf-8"?>
+<ds:datastoreItem xmlns:ds="http://schemas.openxmlformats.org/officeDocument/2006/customXml" ds:itemID="{EAC5C5E7-64B2-47F3-84A2-5A4A99E0956D}">
+  <ds:schemaRefs>
+    <ds:schemaRef ds:uri="http://schemas.microsoft.com/office/2006/metadata/properties"/>
+    <ds:schemaRef ds:uri="http://schemas.microsoft.com/office/infopath/2007/PartnerControls"/>
+    <ds:schemaRef ds:uri="http://purl.org/dc/elements/1.1/"/>
+    <ds:schemaRef ds:uri="http://schemas.microsoft.com/office/2006/documentManagement/types"/>
+    <ds:schemaRef ds:uri="http://www.w3.org/XML/1998/namespace"/>
+    <ds:schemaRef ds:uri="http://purl.org/dc/terms/"/>
+    <ds:schemaRef ds:uri="http://purl.org/dc/dcmitype/"/>
+    <ds:schemaRef ds:uri="0e1bb11d-1fe8-4e80-a80d-c671e8cd2a50"/>
+    <ds:schemaRef ds:uri="http://schemas.openxmlformats.org/package/2006/metadata/core-properties"/>
+  </ds:schemaRefs>
+</ds:datastoreItem>
 </file>
</xml_diff>